<commit_message>
update animation in slide
</commit_message>
<xml_diff>
--- a/presentation.pptx
+++ b/presentation.pptx
@@ -6657,6 +6657,9 @@
   <p:clrMapOvr>
     <a:masterClrMapping/>
   </p:clrMapOvr>
+  <p:transition spd="slow">
+    <p:push dir="u"/>
+  </p:transition>
 </p:sld>
 </file>
 
@@ -7179,13 +7182,13 @@
   <p:clrMapOvr>
     <a:masterClrMapping/>
   </p:clrMapOvr>
-  <mc:AlternateContent xmlns:mc="http://schemas.openxmlformats.org/markup-compatibility/2006">
-    <mc:Choice xmlns:p159="http://schemas.microsoft.com/office/powerpoint/2015/09/main" Requires="p159">
+  <mc:AlternateContent xmlns:mc="http://schemas.openxmlformats.org/markup-compatibility/2006" xmlns:p159="http://schemas.microsoft.com/office/powerpoint/2015/09/main">
+    <mc:Choice Requires="p159">
       <p:transition spd="slow">
         <p159:morph option="byObject"/>
       </p:transition>
     </mc:Choice>
-    <mc:Fallback>
+    <mc:Fallback xmlns="">
       <p:transition spd="slow">
         <p:fade/>
       </p:transition>
@@ -7239,6 +7242,9 @@
           <a:prstGeom prst="rect">
             <a:avLst/>
           </a:prstGeom>
+          <a:effectLst>
+            <a:softEdge rad="38100"/>
+          </a:effectLst>
         </p:spPr>
       </p:pic>
       <p:pic>
@@ -7269,6 +7275,9 @@
           <a:prstGeom prst="rect">
             <a:avLst/>
           </a:prstGeom>
+          <a:effectLst>
+            <a:softEdge rad="38100"/>
+          </a:effectLst>
         </p:spPr>
       </p:pic>
     </p:spTree>
@@ -9490,7 +9499,7 @@
         </p:nvSpPr>
         <p:spPr>
           <a:xfrm>
-            <a:off x="155142" y="1689854"/>
+            <a:off x="155142" y="3136612"/>
             <a:ext cx="4822730" cy="584775"/>
           </a:xfrm>
           <a:prstGeom prst="rect">
@@ -9549,7 +9558,7 @@
         </p:nvSpPr>
         <p:spPr>
           <a:xfrm>
-            <a:off x="155142" y="2575971"/>
+            <a:off x="155142" y="1826250"/>
             <a:ext cx="11948079" cy="1077218"/>
           </a:xfrm>
           <a:prstGeom prst="rect">
@@ -9719,7 +9728,7 @@
                                           </p:stCondLst>
                                         </p:cTn>
                                         <p:tgtEl>
-                                          <p:spTgt spid="4">
+                                          <p:spTgt spid="5">
                                             <p:txEl>
                                               <p:pRg st="0" end="0"/>
                                             </p:txEl>
@@ -9737,7 +9746,7 @@
                                       <p:cBhvr>
                                         <p:cTn id="7" dur="500"/>
                                         <p:tgtEl>
-                                          <p:spTgt spid="4">
+                                          <p:spTgt spid="5">
                                             <p:txEl>
                                               <p:pRg st="0" end="0"/>
                                             </p:txEl>
@@ -9780,7 +9789,7 @@
                                           </p:stCondLst>
                                         </p:cTn>
                                         <p:tgtEl>
-                                          <p:spTgt spid="5">
+                                          <p:spTgt spid="4">
                                             <p:txEl>
                                               <p:pRg st="0" end="0"/>
                                             </p:txEl>
@@ -9798,7 +9807,7 @@
                                       <p:cBhvr>
                                         <p:cTn id="12" dur="500"/>
                                         <p:tgtEl>
-                                          <p:spTgt spid="5">
+                                          <p:spTgt spid="4">
                                             <p:txEl>
                                               <p:pRg st="0" end="0"/>
                                             </p:txEl>

</xml_diff>